<commit_message>
Corrigiendo problemas con home
</commit_message>
<xml_diff>
--- a/survea_logo.pptx
+++ b/survea_logo.pptx
@@ -5,7 +5,7 @@
     <p:sldMasterId id="2147483660" r:id="rId1"/>
   </p:sldMasterIdLst>
   <p:sldIdLst>
-    <p:sldId id="256" r:id="rId2"/>
+    <p:sldId id="257" r:id="rId2"/>
   </p:sldIdLst>
   <p:sldSz cx="7199313" cy="7199313"/>
   <p:notesSz cx="6858000" cy="9144000"/>
@@ -104,6 +104,11 @@
       </a:defRPr>
     </a:lvl9pPr>
   </p:defaultTextStyle>
+  <p:extLst>
+    <p:ext uri="{EFAFB233-063F-42B5-8137-9DF3F51BA10A}">
+      <p15:sldGuideLst xmlns:p15="http://schemas.microsoft.com/office/powerpoint/2012/main"/>
+    </p:ext>
+  </p:extLst>
 </p:presentation>
 </file>
 
@@ -238,7 +243,7 @@
           <a:p>
             <a:fld id="{609F573C-3808-4168-90B0-BE4CF838CDA0}" type="datetimeFigureOut">
               <a:rPr lang="es-VE" smtClean="0"/>
-              <a:t>15/2/2022</a:t>
+              <a:t>16/2/2022</a:t>
             </a:fld>
             <a:endParaRPr lang="es-VE"/>
           </a:p>
@@ -408,7 +413,7 @@
           <a:p>
             <a:fld id="{609F573C-3808-4168-90B0-BE4CF838CDA0}" type="datetimeFigureOut">
               <a:rPr lang="es-VE" smtClean="0"/>
-              <a:t>15/2/2022</a:t>
+              <a:t>16/2/2022</a:t>
             </a:fld>
             <a:endParaRPr lang="es-VE"/>
           </a:p>
@@ -588,7 +593,7 @@
           <a:p>
             <a:fld id="{609F573C-3808-4168-90B0-BE4CF838CDA0}" type="datetimeFigureOut">
               <a:rPr lang="es-VE" smtClean="0"/>
-              <a:t>15/2/2022</a:t>
+              <a:t>16/2/2022</a:t>
             </a:fld>
             <a:endParaRPr lang="es-VE"/>
           </a:p>
@@ -758,7 +763,7 @@
           <a:p>
             <a:fld id="{609F573C-3808-4168-90B0-BE4CF838CDA0}" type="datetimeFigureOut">
               <a:rPr lang="es-VE" smtClean="0"/>
-              <a:t>15/2/2022</a:t>
+              <a:t>16/2/2022</a:t>
             </a:fld>
             <a:endParaRPr lang="es-VE"/>
           </a:p>
@@ -1002,7 +1007,7 @@
           <a:p>
             <a:fld id="{609F573C-3808-4168-90B0-BE4CF838CDA0}" type="datetimeFigureOut">
               <a:rPr lang="es-VE" smtClean="0"/>
-              <a:t>15/2/2022</a:t>
+              <a:t>16/2/2022</a:t>
             </a:fld>
             <a:endParaRPr lang="es-VE"/>
           </a:p>
@@ -1234,7 +1239,7 @@
           <a:p>
             <a:fld id="{609F573C-3808-4168-90B0-BE4CF838CDA0}" type="datetimeFigureOut">
               <a:rPr lang="es-VE" smtClean="0"/>
-              <a:t>15/2/2022</a:t>
+              <a:t>16/2/2022</a:t>
             </a:fld>
             <a:endParaRPr lang="es-VE"/>
           </a:p>
@@ -1601,7 +1606,7 @@
           <a:p>
             <a:fld id="{609F573C-3808-4168-90B0-BE4CF838CDA0}" type="datetimeFigureOut">
               <a:rPr lang="es-VE" smtClean="0"/>
-              <a:t>15/2/2022</a:t>
+              <a:t>16/2/2022</a:t>
             </a:fld>
             <a:endParaRPr lang="es-VE"/>
           </a:p>
@@ -1719,7 +1724,7 @@
           <a:p>
             <a:fld id="{609F573C-3808-4168-90B0-BE4CF838CDA0}" type="datetimeFigureOut">
               <a:rPr lang="es-VE" smtClean="0"/>
-              <a:t>15/2/2022</a:t>
+              <a:t>16/2/2022</a:t>
             </a:fld>
             <a:endParaRPr lang="es-VE"/>
           </a:p>
@@ -1814,7 +1819,7 @@
           <a:p>
             <a:fld id="{609F573C-3808-4168-90B0-BE4CF838CDA0}" type="datetimeFigureOut">
               <a:rPr lang="es-VE" smtClean="0"/>
-              <a:t>15/2/2022</a:t>
+              <a:t>16/2/2022</a:t>
             </a:fld>
             <a:endParaRPr lang="es-VE"/>
           </a:p>
@@ -2091,7 +2096,7 @@
           <a:p>
             <a:fld id="{609F573C-3808-4168-90B0-BE4CF838CDA0}" type="datetimeFigureOut">
               <a:rPr lang="es-VE" smtClean="0"/>
-              <a:t>15/2/2022</a:t>
+              <a:t>16/2/2022</a:t>
             </a:fld>
             <a:endParaRPr lang="es-VE"/>
           </a:p>
@@ -2348,7 +2353,7 @@
           <a:p>
             <a:fld id="{609F573C-3808-4168-90B0-BE4CF838CDA0}" type="datetimeFigureOut">
               <a:rPr lang="es-VE" smtClean="0"/>
-              <a:t>15/2/2022</a:t>
+              <a:t>16/2/2022</a:t>
             </a:fld>
             <a:endParaRPr lang="es-VE"/>
           </a:p>
@@ -2561,7 +2566,7 @@
           <a:p>
             <a:fld id="{609F573C-3808-4168-90B0-BE4CF838CDA0}" type="datetimeFigureOut">
               <a:rPr lang="es-VE" smtClean="0"/>
-              <a:t>15/2/2022</a:t>
+              <a:t>16/2/2022</a:t>
             </a:fld>
             <a:endParaRPr lang="es-VE"/>
           </a:p>
@@ -2980,8 +2985,8 @@
         </p:nvGrpSpPr>
         <p:grpSpPr>
           <a:xfrm>
-            <a:off x="169337" y="528666"/>
-            <a:ext cx="6860638" cy="6141980"/>
+            <a:off x="1161256" y="1161256"/>
+            <a:ext cx="4876800" cy="4876800"/>
             <a:chOff x="2926083" y="425076"/>
             <a:chExt cx="6535382" cy="5850795"/>
           </a:xfrm>
@@ -3406,7 +3411,7 @@
     </p:spTree>
     <p:extLst>
       <p:ext uri="{BB962C8B-B14F-4D97-AF65-F5344CB8AC3E}">
-        <p14:creationId xmlns:p14="http://schemas.microsoft.com/office/powerpoint/2010/main" val="1107731455"/>
+        <p14:creationId xmlns:p14="http://schemas.microsoft.com/office/powerpoint/2010/main" val="3123538548"/>
       </p:ext>
     </p:extLst>
   </p:cSld>

</xml_diff>